<commit_message>
Fixed minor changes to ppt
</commit_message>
<xml_diff>
--- a/Hands-OnSession/Content/SOM Hands-On Exercise 2.pptx
+++ b/Hands-OnSession/Content/SOM Hands-On Exercise 2.pptx
@@ -124,7 +124,7 @@
   </p:defaultTextStyle>
   <p:extLst>
     <p:ext uri="{521415D9-36F7-43E2-AB2F-B90AF26B5E84}">
-      <p14:sectionLst xmlns="" xmlns:p14="http://schemas.microsoft.com/office/powerpoint/2010/main">
+      <p14:sectionLst xmlns:p14="http://schemas.microsoft.com/office/powerpoint/2010/main">
         <p14:section name="Default Section" id="{2AB54184-73E1-4460-90E2-8151E55104BE}">
           <p14:sldIdLst>
             <p14:sldId id="256"/>
@@ -151,7 +151,18 @@
       </p14:sectionLst>
     </p:ext>
     <p:ext uri="{EFAFB233-063F-42B5-8137-9DF3F51BA10A}">
-      <p15:sldGuideLst xmlns="" xmlns:p15="http://schemas.microsoft.com/office/powerpoint/2012/main"/>
+      <p15:sldGuideLst xmlns:p15="http://schemas.microsoft.com/office/powerpoint/2012/main">
+        <p15:guide id="1" orient="horz" pos="2160">
+          <p15:clr>
+            <a:srgbClr val="A4A3A4"/>
+          </p15:clr>
+        </p15:guide>
+        <p15:guide id="2" pos="3840">
+          <p15:clr>
+            <a:srgbClr val="A4A3A4"/>
+          </p15:clr>
+        </p15:guide>
+      </p15:sldGuideLst>
     </p:ext>
   </p:extLst>
 </p:presentation>
@@ -289,7 +300,7 @@
             <a:fld id="{7E25EC0B-754B-4A80-883F-145E4B31EADE}" type="datetimeFigureOut">
               <a:rPr lang="en-US" smtClean="0"/>
               <a:pPr/>
-              <a:t>7/27/2015</a:t>
+              <a:t>7/31/2015</a:t>
             </a:fld>
             <a:endParaRPr lang="en-US"/>
           </a:p>
@@ -341,7 +352,7 @@
     </p:spTree>
     <p:extLst>
       <p:ext uri="{BB962C8B-B14F-4D97-AF65-F5344CB8AC3E}">
-        <p14:creationId xmlns="" xmlns:p14="http://schemas.microsoft.com/office/powerpoint/2010/main" val="3136077572"/>
+        <p14:creationId xmlns:p14="http://schemas.microsoft.com/office/powerpoint/2010/main" val="3136077572"/>
       </p:ext>
     </p:extLst>
   </p:cSld>
@@ -461,7 +472,7 @@
             <a:fld id="{7E25EC0B-754B-4A80-883F-145E4B31EADE}" type="datetimeFigureOut">
               <a:rPr lang="en-US" smtClean="0"/>
               <a:pPr/>
-              <a:t>7/27/2015</a:t>
+              <a:t>7/31/2015</a:t>
             </a:fld>
             <a:endParaRPr lang="en-US"/>
           </a:p>
@@ -513,7 +524,7 @@
     </p:spTree>
     <p:extLst>
       <p:ext uri="{BB962C8B-B14F-4D97-AF65-F5344CB8AC3E}">
-        <p14:creationId xmlns="" xmlns:p14="http://schemas.microsoft.com/office/powerpoint/2010/main" val="607129383"/>
+        <p14:creationId xmlns:p14="http://schemas.microsoft.com/office/powerpoint/2010/main" val="607129383"/>
       </p:ext>
     </p:extLst>
   </p:cSld>
@@ -643,7 +654,7 @@
             <a:fld id="{7E25EC0B-754B-4A80-883F-145E4B31EADE}" type="datetimeFigureOut">
               <a:rPr lang="en-US" smtClean="0"/>
               <a:pPr/>
-              <a:t>7/27/2015</a:t>
+              <a:t>7/31/2015</a:t>
             </a:fld>
             <a:endParaRPr lang="en-US"/>
           </a:p>
@@ -695,7 +706,7 @@
     </p:spTree>
     <p:extLst>
       <p:ext uri="{BB962C8B-B14F-4D97-AF65-F5344CB8AC3E}">
-        <p14:creationId xmlns="" xmlns:p14="http://schemas.microsoft.com/office/powerpoint/2010/main" val="1111243704"/>
+        <p14:creationId xmlns:p14="http://schemas.microsoft.com/office/powerpoint/2010/main" val="1111243704"/>
       </p:ext>
     </p:extLst>
   </p:cSld>
@@ -815,7 +826,7 @@
             <a:fld id="{7E25EC0B-754B-4A80-883F-145E4B31EADE}" type="datetimeFigureOut">
               <a:rPr lang="en-US" smtClean="0"/>
               <a:pPr/>
-              <a:t>7/27/2015</a:t>
+              <a:t>7/31/2015</a:t>
             </a:fld>
             <a:endParaRPr lang="en-US"/>
           </a:p>
@@ -867,7 +878,7 @@
     </p:spTree>
     <p:extLst>
       <p:ext uri="{BB962C8B-B14F-4D97-AF65-F5344CB8AC3E}">
-        <p14:creationId xmlns="" xmlns:p14="http://schemas.microsoft.com/office/powerpoint/2010/main" val="3643408091"/>
+        <p14:creationId xmlns:p14="http://schemas.microsoft.com/office/powerpoint/2010/main" val="3643408091"/>
       </p:ext>
     </p:extLst>
   </p:cSld>
@@ -1063,7 +1074,7 @@
             <a:fld id="{7E25EC0B-754B-4A80-883F-145E4B31EADE}" type="datetimeFigureOut">
               <a:rPr lang="en-US" smtClean="0"/>
               <a:pPr/>
-              <a:t>7/27/2015</a:t>
+              <a:t>7/31/2015</a:t>
             </a:fld>
             <a:endParaRPr lang="en-US"/>
           </a:p>
@@ -1115,7 +1126,7 @@
     </p:spTree>
     <p:extLst>
       <p:ext uri="{BB962C8B-B14F-4D97-AF65-F5344CB8AC3E}">
-        <p14:creationId xmlns="" xmlns:p14="http://schemas.microsoft.com/office/powerpoint/2010/main" val="3877002720"/>
+        <p14:creationId xmlns:p14="http://schemas.microsoft.com/office/powerpoint/2010/main" val="3877002720"/>
       </p:ext>
     </p:extLst>
   </p:cSld>
@@ -1297,7 +1308,7 @@
             <a:fld id="{7E25EC0B-754B-4A80-883F-145E4B31EADE}" type="datetimeFigureOut">
               <a:rPr lang="en-US" smtClean="0"/>
               <a:pPr/>
-              <a:t>7/27/2015</a:t>
+              <a:t>7/31/2015</a:t>
             </a:fld>
             <a:endParaRPr lang="en-US"/>
           </a:p>
@@ -1349,7 +1360,7 @@
     </p:spTree>
     <p:extLst>
       <p:ext uri="{BB962C8B-B14F-4D97-AF65-F5344CB8AC3E}">
-        <p14:creationId xmlns="" xmlns:p14="http://schemas.microsoft.com/office/powerpoint/2010/main" val="3968856589"/>
+        <p14:creationId xmlns:p14="http://schemas.microsoft.com/office/powerpoint/2010/main" val="3968856589"/>
       </p:ext>
     </p:extLst>
   </p:cSld>
@@ -1666,7 +1677,7 @@
             <a:fld id="{7E25EC0B-754B-4A80-883F-145E4B31EADE}" type="datetimeFigureOut">
               <a:rPr lang="en-US" smtClean="0"/>
               <a:pPr/>
-              <a:t>7/27/2015</a:t>
+              <a:t>7/31/2015</a:t>
             </a:fld>
             <a:endParaRPr lang="en-US"/>
           </a:p>
@@ -1718,7 +1729,7 @@
     </p:spTree>
     <p:extLst>
       <p:ext uri="{BB962C8B-B14F-4D97-AF65-F5344CB8AC3E}">
-        <p14:creationId xmlns="" xmlns:p14="http://schemas.microsoft.com/office/powerpoint/2010/main" val="830376763"/>
+        <p14:creationId xmlns:p14="http://schemas.microsoft.com/office/powerpoint/2010/main" val="830376763"/>
       </p:ext>
     </p:extLst>
   </p:cSld>
@@ -1786,7 +1797,7 @@
             <a:fld id="{7E25EC0B-754B-4A80-883F-145E4B31EADE}" type="datetimeFigureOut">
               <a:rPr lang="en-US" smtClean="0"/>
               <a:pPr/>
-              <a:t>7/27/2015</a:t>
+              <a:t>7/31/2015</a:t>
             </a:fld>
             <a:endParaRPr lang="en-US"/>
           </a:p>
@@ -1838,7 +1849,7 @@
     </p:spTree>
     <p:extLst>
       <p:ext uri="{BB962C8B-B14F-4D97-AF65-F5344CB8AC3E}">
-        <p14:creationId xmlns="" xmlns:p14="http://schemas.microsoft.com/office/powerpoint/2010/main" val="2026636009"/>
+        <p14:creationId xmlns:p14="http://schemas.microsoft.com/office/powerpoint/2010/main" val="2026636009"/>
       </p:ext>
     </p:extLst>
   </p:cSld>
@@ -1883,7 +1894,7 @@
             <a:fld id="{7E25EC0B-754B-4A80-883F-145E4B31EADE}" type="datetimeFigureOut">
               <a:rPr lang="en-US" smtClean="0"/>
               <a:pPr/>
-              <a:t>7/27/2015</a:t>
+              <a:t>7/31/2015</a:t>
             </a:fld>
             <a:endParaRPr lang="en-US"/>
           </a:p>
@@ -1935,7 +1946,7 @@
     </p:spTree>
     <p:extLst>
       <p:ext uri="{BB962C8B-B14F-4D97-AF65-F5344CB8AC3E}">
-        <p14:creationId xmlns="" xmlns:p14="http://schemas.microsoft.com/office/powerpoint/2010/main" val="2409136269"/>
+        <p14:creationId xmlns:p14="http://schemas.microsoft.com/office/powerpoint/2010/main" val="2409136269"/>
       </p:ext>
     </p:extLst>
   </p:cSld>
@@ -2162,7 +2173,7 @@
             <a:fld id="{7E25EC0B-754B-4A80-883F-145E4B31EADE}" type="datetimeFigureOut">
               <a:rPr lang="en-US" smtClean="0"/>
               <a:pPr/>
-              <a:t>7/27/2015</a:t>
+              <a:t>7/31/2015</a:t>
             </a:fld>
             <a:endParaRPr lang="en-US"/>
           </a:p>
@@ -2214,7 +2225,7 @@
     </p:spTree>
     <p:extLst>
       <p:ext uri="{BB962C8B-B14F-4D97-AF65-F5344CB8AC3E}">
-        <p14:creationId xmlns="" xmlns:p14="http://schemas.microsoft.com/office/powerpoint/2010/main" val="3936578497"/>
+        <p14:creationId xmlns:p14="http://schemas.microsoft.com/office/powerpoint/2010/main" val="3936578497"/>
       </p:ext>
     </p:extLst>
   </p:cSld>
@@ -2417,7 +2428,7 @@
             <a:fld id="{7E25EC0B-754B-4A80-883F-145E4B31EADE}" type="datetimeFigureOut">
               <a:rPr lang="en-US" smtClean="0"/>
               <a:pPr/>
-              <a:t>7/27/2015</a:t>
+              <a:t>7/31/2015</a:t>
             </a:fld>
             <a:endParaRPr lang="en-US"/>
           </a:p>
@@ -2469,7 +2480,7 @@
     </p:spTree>
     <p:extLst>
       <p:ext uri="{BB962C8B-B14F-4D97-AF65-F5344CB8AC3E}">
-        <p14:creationId xmlns="" xmlns:p14="http://schemas.microsoft.com/office/powerpoint/2010/main" val="1542778836"/>
+        <p14:creationId xmlns:p14="http://schemas.microsoft.com/office/powerpoint/2010/main" val="1542778836"/>
       </p:ext>
     </p:extLst>
   </p:cSld>
@@ -2632,7 +2643,7 @@
             <a:fld id="{7E25EC0B-754B-4A80-883F-145E4B31EADE}" type="datetimeFigureOut">
               <a:rPr lang="en-US" smtClean="0"/>
               <a:pPr/>
-              <a:t>7/27/2015</a:t>
+              <a:t>7/31/2015</a:t>
             </a:fld>
             <a:endParaRPr lang="en-US"/>
           </a:p>
@@ -2720,7 +2731,7 @@
     </p:spTree>
     <p:extLst>
       <p:ext uri="{BB962C8B-B14F-4D97-AF65-F5344CB8AC3E}">
-        <p14:creationId xmlns="" xmlns:p14="http://schemas.microsoft.com/office/powerpoint/2010/main" val="1866208585"/>
+        <p14:creationId xmlns:p14="http://schemas.microsoft.com/office/powerpoint/2010/main" val="1866208585"/>
       </p:ext>
     </p:extLst>
   </p:cSld>
@@ -3068,7 +3079,7 @@
     </p:spTree>
     <p:extLst>
       <p:ext uri="{BB962C8B-B14F-4D97-AF65-F5344CB8AC3E}">
-        <p14:creationId xmlns="" xmlns:p14="http://schemas.microsoft.com/office/powerpoint/2010/main" val="167897482"/>
+        <p14:creationId xmlns:p14="http://schemas.microsoft.com/office/powerpoint/2010/main" val="167897482"/>
       </p:ext>
     </p:extLst>
   </p:cSld>
@@ -3985,7 +3996,7 @@
     </p:spTree>
     <p:extLst>
       <p:ext uri="{BB962C8B-B14F-4D97-AF65-F5344CB8AC3E}">
-        <p14:creationId xmlns="" xmlns:p14="http://schemas.microsoft.com/office/powerpoint/2010/main" val="1689403257"/>
+        <p14:creationId xmlns:p14="http://schemas.microsoft.com/office/powerpoint/2010/main" val="1689403257"/>
       </p:ext>
     </p:extLst>
   </p:cSld>
@@ -4019,6 +4030,30 @@
           <a:chExt cx="0" cy="0"/>
         </a:xfrm>
       </p:grpSpPr>
+      <p:pic>
+        <p:nvPicPr>
+          <p:cNvPr id="3" name="Picture 2"/>
+          <p:cNvPicPr>
+            <a:picLocks noChangeAspect="1"/>
+          </p:cNvPicPr>
+          <p:nvPr/>
+        </p:nvPicPr>
+        <p:blipFill>
+          <a:blip r:embed="rId2"/>
+          <a:stretch>
+            <a:fillRect/>
+          </a:stretch>
+        </p:blipFill>
+        <p:spPr>
+          <a:xfrm>
+            <a:off x="430686" y="315516"/>
+            <a:ext cx="5411672" cy="4280565"/>
+          </a:xfrm>
+          <a:prstGeom prst="rect">
+            <a:avLst/>
+          </a:prstGeom>
+        </p:spPr>
+      </p:pic>
       <p:sp>
         <p:nvSpPr>
           <p:cNvPr id="6" name="Text Placeholder 5"/>
@@ -4037,7 +4072,7 @@
         </p:spPr>
         <p:txBody>
           <a:bodyPr>
-            <a:normAutofit/>
+            <a:normAutofit lnSpcReduction="10000"/>
           </a:bodyPr>
           <a:lstStyle/>
           <a:p>
@@ -4059,7 +4094,23 @@
           <a:p>
             <a:r>
               <a:rPr lang="en-US" sz="1800" dirty="0" smtClean="0"/>
-              <a:t>Right Click on the “” Terminal of SPI Engine and create constant. Select the appropriate I/O terminals to match the ones in Ex-1</a:t>
+              <a:t>Right Click on the </a:t>
+            </a:r>
+            <a:r>
+              <a:rPr lang="en-US" sz="1800" dirty="0" smtClean="0"/>
+              <a:t>“Enable Lines” </a:t>
+            </a:r>
+            <a:r>
+              <a:rPr lang="en-US" sz="1800" dirty="0" smtClean="0"/>
+              <a:t>Terminal of SPI Engine and </a:t>
+            </a:r>
+            <a:r>
+              <a:rPr lang="en-US" sz="1800" dirty="0" smtClean="0"/>
+              <a:t>create a </a:t>
+            </a:r>
+            <a:r>
+              <a:rPr lang="en-US" sz="1800" dirty="0" smtClean="0"/>
+              <a:t>constant. Select the appropriate I/O terminals to match the ones in Ex-1</a:t>
             </a:r>
           </a:p>
           <a:p>
@@ -4075,7 +4126,15 @@
           <a:p>
             <a:r>
               <a:rPr lang="en-US" sz="1800" dirty="0"/>
-              <a:t>Right Click on the “” Terminal of SPI Engine and create constant. Select the appropriate I/O terminals to match the ones in </a:t>
+              <a:t>Right Click on the </a:t>
+            </a:r>
+            <a:r>
+              <a:rPr lang="en-US" sz="1800" dirty="0" smtClean="0"/>
+              <a:t>“SPI DIO Lines” </a:t>
+            </a:r>
+            <a:r>
+              <a:rPr lang="en-US" sz="1800" dirty="0"/>
+              <a:t>Terminal of SPI Engine and create constant. Select the appropriate I/O terminals to match the ones in </a:t>
             </a:r>
             <a:r>
               <a:rPr lang="en-US" sz="1800" dirty="0" smtClean="0"/>
@@ -4096,9 +4155,33 @@
           <a:p>
             <a:r>
               <a:rPr lang="en-US" sz="1800" dirty="0" smtClean="0"/>
-              <a:t>Select the I/O terminals and enable terminals to match Ex-1. This is crucial step, it is very common to do simulation at this step to verify correctness of the code.</a:t>
-            </a:r>
-            <a:endParaRPr lang="en-US" sz="1800" dirty="0"/>
+              <a:t>Select the I/O terminals and enable terminals to match Ex-1. This is crucial step, it is very common to do simulation at this step to verify correctness of the code</a:t>
+            </a:r>
+            <a:r>
+              <a:rPr lang="en-US" sz="1800" dirty="0" smtClean="0"/>
+              <a:t>.</a:t>
+            </a:r>
+          </a:p>
+          <a:p>
+            <a:pPr marL="285750" indent="-285750">
+              <a:buFont typeface="Arial" panose="020B0604020202020204" pitchFamily="34" charset="0"/>
+              <a:buChar char="•"/>
+            </a:pPr>
+            <a:r>
+              <a:rPr lang="en-US" sz="2400" b="1" i="1" dirty="0" smtClean="0"/>
+              <a:t>Create a Control for SPI PHY Settings</a:t>
+            </a:r>
+          </a:p>
+          <a:p>
+            <a:r>
+              <a:rPr lang="en-US" sz="1800" dirty="0" smtClean="0"/>
+              <a:t>Right click on the </a:t>
+            </a:r>
+            <a:r>
+              <a:rPr lang="en-US" sz="1800" dirty="0" smtClean="0"/>
+              <a:t>“SPY PHY Settings” Terminal of the SPI Commands Microphone ADC.vi and create a control.</a:t>
+            </a:r>
+            <a:endParaRPr lang="en-US" sz="1800" dirty="0" smtClean="0"/>
           </a:p>
           <a:p>
             <a:pPr marL="342900" indent="-342900">
@@ -4113,7 +4196,11 @@
           <a:p>
             <a:r>
               <a:rPr lang="en-US" sz="1800" dirty="0" smtClean="0"/>
-              <a:t>Check to ensure that final FPGA Code matches the picture shown in left</a:t>
+              <a:t>Check </a:t>
+            </a:r>
+            <a:r>
+              <a:rPr lang="en-US" sz="1800" dirty="0" smtClean="0"/>
+              <a:t>to ensure that final FPGA Code matches the picture shown in left</a:t>
             </a:r>
           </a:p>
           <a:p>
@@ -4219,36 +4306,6 @@
           </a:p>
         </p:txBody>
       </p:sp>
-      <p:pic>
-        <p:nvPicPr>
-          <p:cNvPr id="8" name="Picture 7"/>
-          <p:cNvPicPr/>
-          <p:nvPr/>
-        </p:nvPicPr>
-        <p:blipFill>
-          <a:blip r:embed="rId2" cstate="print"/>
-          <a:srcRect/>
-          <a:stretch>
-            <a:fillRect/>
-          </a:stretch>
-        </p:blipFill>
-        <p:spPr bwMode="auto">
-          <a:xfrm>
-            <a:off x="513850" y="492080"/>
-            <a:ext cx="5939155" cy="4567555"/>
-          </a:xfrm>
-          <a:prstGeom prst="rect">
-            <a:avLst/>
-          </a:prstGeom>
-          <a:noFill/>
-          <a:ln w="9525">
-            <a:noFill/>
-            <a:miter lim="800000"/>
-            <a:headEnd/>
-            <a:tailEnd/>
-          </a:ln>
-        </p:spPr>
-      </p:pic>
       <p:sp>
         <p:nvSpPr>
           <p:cNvPr id="2" name="Oval 1"/>
@@ -4257,8 +4314,8 @@
         </p:nvSpPr>
         <p:spPr>
           <a:xfrm>
-            <a:off x="326115" y="837667"/>
-            <a:ext cx="2410691" cy="2090971"/>
+            <a:off x="861769" y="1381344"/>
+            <a:ext cx="1655258" cy="1493128"/>
           </a:xfrm>
           <a:prstGeom prst="ellipse">
             <a:avLst/>
@@ -4303,8 +4360,8 @@
         </p:nvSpPr>
         <p:spPr>
           <a:xfrm>
-            <a:off x="2597489" y="210936"/>
-            <a:ext cx="2410691" cy="2090971"/>
+            <a:off x="976037" y="195573"/>
+            <a:ext cx="1581221" cy="1525159"/>
           </a:xfrm>
           <a:prstGeom prst="ellipse">
             <a:avLst/>
@@ -4384,9 +4441,9 @@
           <p:nvPr/>
         </p:nvCxnSpPr>
         <p:spPr>
-          <a:xfrm flipV="1">
-            <a:off x="3983715" y="2267109"/>
-            <a:ext cx="3802" cy="3264600"/>
+          <a:xfrm flipH="1" flipV="1">
+            <a:off x="2477775" y="1381344"/>
+            <a:ext cx="1505940" cy="4150365"/>
           </a:xfrm>
           <a:prstGeom prst="straightConnector1">
             <a:avLst/>
@@ -4476,7 +4533,7 @@
     </p:spTree>
     <p:extLst>
       <p:ext uri="{BB962C8B-B14F-4D97-AF65-F5344CB8AC3E}">
-        <p14:creationId xmlns="" xmlns:p14="http://schemas.microsoft.com/office/powerpoint/2010/main" val="1495398492"/>
+        <p14:creationId xmlns:p14="http://schemas.microsoft.com/office/powerpoint/2010/main" val="1495398492"/>
       </p:ext>
     </p:extLst>
   </p:cSld>
@@ -4809,7 +4866,7 @@
     </p:spTree>
     <p:extLst>
       <p:ext uri="{BB962C8B-B14F-4D97-AF65-F5344CB8AC3E}">
-        <p14:creationId xmlns="" xmlns:p14="http://schemas.microsoft.com/office/powerpoint/2010/main" val="2965864190"/>
+        <p14:creationId xmlns:p14="http://schemas.microsoft.com/office/powerpoint/2010/main" val="2965864190"/>
       </p:ext>
     </p:extLst>
   </p:cSld>
@@ -5170,7 +5227,7 @@
     </p:spTree>
     <p:extLst>
       <p:ext uri="{BB962C8B-B14F-4D97-AF65-F5344CB8AC3E}">
-        <p14:creationId xmlns="" xmlns:p14="http://schemas.microsoft.com/office/powerpoint/2010/main" val="3463387837"/>
+        <p14:creationId xmlns:p14="http://schemas.microsoft.com/office/powerpoint/2010/main" val="3463387837"/>
       </p:ext>
     </p:extLst>
   </p:cSld>
@@ -5546,7 +5603,7 @@
     </p:spTree>
     <p:extLst>
       <p:ext uri="{BB962C8B-B14F-4D97-AF65-F5344CB8AC3E}">
-        <p14:creationId xmlns="" xmlns:p14="http://schemas.microsoft.com/office/powerpoint/2010/main" val="225510435"/>
+        <p14:creationId xmlns:p14="http://schemas.microsoft.com/office/powerpoint/2010/main" val="225510435"/>
       </p:ext>
     </p:extLst>
   </p:cSld>
@@ -6201,7 +6258,7 @@
     </p:spTree>
     <p:extLst>
       <p:ext uri="{BB962C8B-B14F-4D97-AF65-F5344CB8AC3E}">
-        <p14:creationId xmlns="" xmlns:p14="http://schemas.microsoft.com/office/powerpoint/2010/main" val="3286381031"/>
+        <p14:creationId xmlns:p14="http://schemas.microsoft.com/office/powerpoint/2010/main" val="3286381031"/>
       </p:ext>
     </p:extLst>
   </p:cSld>
@@ -6497,7 +6554,7 @@
     </p:spTree>
     <p:extLst>
       <p:ext uri="{BB962C8B-B14F-4D97-AF65-F5344CB8AC3E}">
-        <p14:creationId xmlns="" xmlns:p14="http://schemas.microsoft.com/office/powerpoint/2010/main" val="3708638521"/>
+        <p14:creationId xmlns:p14="http://schemas.microsoft.com/office/powerpoint/2010/main" val="3708638521"/>
       </p:ext>
     </p:extLst>
   </p:cSld>
@@ -6841,7 +6898,7 @@
     </p:spTree>
     <p:extLst>
       <p:ext uri="{BB962C8B-B14F-4D97-AF65-F5344CB8AC3E}">
-        <p14:creationId xmlns="" xmlns:p14="http://schemas.microsoft.com/office/powerpoint/2010/main" val="2706572787"/>
+        <p14:creationId xmlns:p14="http://schemas.microsoft.com/office/powerpoint/2010/main" val="2706572787"/>
       </p:ext>
     </p:extLst>
   </p:cSld>
@@ -7219,7 +7276,7 @@
     </p:spTree>
     <p:extLst>
       <p:ext uri="{BB962C8B-B14F-4D97-AF65-F5344CB8AC3E}">
-        <p14:creationId xmlns="" xmlns:p14="http://schemas.microsoft.com/office/powerpoint/2010/main" val="3058657415"/>
+        <p14:creationId xmlns:p14="http://schemas.microsoft.com/office/powerpoint/2010/main" val="3058657415"/>
       </p:ext>
     </p:extLst>
   </p:cSld>
@@ -7426,7 +7483,7 @@
     </p:spTree>
     <p:extLst>
       <p:ext uri="{BB962C8B-B14F-4D97-AF65-F5344CB8AC3E}">
-        <p14:creationId xmlns="" xmlns:p14="http://schemas.microsoft.com/office/powerpoint/2010/main" val="2088308568"/>
+        <p14:creationId xmlns:p14="http://schemas.microsoft.com/office/powerpoint/2010/main" val="2088308568"/>
       </p:ext>
     </p:extLst>
   </p:cSld>
@@ -7490,11 +7547,11 @@
           <a:p>
             <a:r>
               <a:rPr lang="en-US" sz="2400" dirty="0" smtClean="0"/>
-              <a:t>Expand </a:t>
+              <a:t>Description of </a:t>
             </a:r>
             <a:r>
               <a:rPr lang="en-US" sz="2400" dirty="0"/>
-              <a:t>of the Exercise </a:t>
+              <a:t>Exercise </a:t>
             </a:r>
             <a:r>
               <a:rPr lang="en-US" sz="2400" dirty="0" smtClean="0"/>
@@ -7512,7 +7569,7 @@
             </a:r>
             <a:r>
               <a:rPr lang="en-US" sz="2400" dirty="0" smtClean="0"/>
-              <a:t>System on Module (sbRIO-9651) system </a:t>
+              <a:t>System on Module (sbRIO-9651) </a:t>
             </a:r>
             <a:r>
               <a:rPr lang="en-US" sz="2400" dirty="0"/>
@@ -7531,7 +7588,15 @@
           <a:p>
             <a:r>
               <a:rPr lang="en-US" sz="2400" dirty="0"/>
-              <a:t>To expand the hierarchy and reveal the contents of the project, click the “+” boxes next to each part of the </a:t>
+              <a:t>To expand the hierarchy and reveal the </a:t>
+            </a:r>
+            <a:r>
+              <a:rPr lang="en-US" sz="2400" dirty="0" smtClean="0"/>
+              <a:t>content </a:t>
+            </a:r>
+            <a:r>
+              <a:rPr lang="en-US" sz="2400" dirty="0"/>
+              <a:t>of the project, click the “+” boxes next to each part of the </a:t>
             </a:r>
             <a:r>
               <a:rPr lang="en-US" sz="2400" dirty="0" err="1" smtClean="0"/>
@@ -8024,7 +8089,7 @@
     </p:spTree>
     <p:extLst>
       <p:ext uri="{BB962C8B-B14F-4D97-AF65-F5344CB8AC3E}">
-        <p14:creationId xmlns="" xmlns:p14="http://schemas.microsoft.com/office/powerpoint/2010/main" val="2925144874"/>
+        <p14:creationId xmlns:p14="http://schemas.microsoft.com/office/powerpoint/2010/main" val="2925144874"/>
       </p:ext>
     </p:extLst>
   </p:cSld>
@@ -8099,7 +8164,7 @@
             </a:r>
             <a:r>
               <a:rPr lang="en-US" sz="2000" dirty="0" smtClean="0"/>
-              <a:t>	to open the VI Package Manager</a:t>
+              <a:t>to open the VI Package Manager</a:t>
             </a:r>
             <a:endParaRPr lang="en-US" sz="2000" dirty="0"/>
           </a:p>
@@ -8127,7 +8192,7 @@
           <a:p>
             <a:r>
               <a:rPr lang="en-US" sz="2000" dirty="0" smtClean="0"/>
-              <a:t>To install </a:t>
+              <a:t>To install the </a:t>
             </a:r>
             <a:r>
               <a:rPr lang="en-US" sz="2000" dirty="0" err="1" smtClean="0"/>
@@ -8166,7 +8231,7 @@
           <a:p>
             <a:r>
               <a:rPr lang="en-US" sz="2000" dirty="0" smtClean="0"/>
-              <a:t>We will use this library for rest of our exercise as it has both FPGA and RT code templates which will reduce code development for Acquisition Projects on Real-Time OS.</a:t>
+              <a:t>We will use this library for rest of our exercise as it has both FPGA and RT code templates which will reduce code development for Acquisition Projects on the Real-Time OS.</a:t>
             </a:r>
           </a:p>
           <a:p>
@@ -8517,7 +8582,7 @@
     </p:spTree>
     <p:extLst>
       <p:ext uri="{BB962C8B-B14F-4D97-AF65-F5344CB8AC3E}">
-        <p14:creationId xmlns="" xmlns:p14="http://schemas.microsoft.com/office/powerpoint/2010/main" val="1149022658"/>
+        <p14:creationId xmlns:p14="http://schemas.microsoft.com/office/powerpoint/2010/main" val="1149022658"/>
       </p:ext>
     </p:extLst>
   </p:cSld>
@@ -8599,7 +8664,11 @@
             </a:r>
             <a:r>
               <a:rPr lang="en-US" sz="2000" dirty="0" smtClean="0"/>
-              <a:t> Waveform Library” in VI Package Manager to start the installer</a:t>
+              <a:t> Waveform Library” in VI Package Manager to start the </a:t>
+            </a:r>
+            <a:r>
+              <a:rPr lang="en-US" sz="2000" dirty="0" err="1" smtClean="0"/>
+              <a:t>installion</a:t>
             </a:r>
             <a:endParaRPr lang="en-US" sz="2000" dirty="0"/>
           </a:p>
@@ -8619,7 +8688,23 @@
           <a:p>
             <a:r>
               <a:rPr lang="en-US" sz="2000" dirty="0" smtClean="0"/>
-              <a:t>Click on the install button to start installation of waveform library</a:t>
+              <a:t>Click on the install button to start </a:t>
+            </a:r>
+            <a:r>
+              <a:rPr lang="en-US" sz="2000" dirty="0" smtClean="0"/>
+              <a:t>the installation </a:t>
+            </a:r>
+            <a:r>
+              <a:rPr lang="en-US" sz="2000" dirty="0" smtClean="0"/>
+              <a:t>of </a:t>
+            </a:r>
+            <a:r>
+              <a:rPr lang="en-US" sz="2000" dirty="0" smtClean="0"/>
+              <a:t>the waveform </a:t>
+            </a:r>
+            <a:r>
+              <a:rPr lang="en-US" sz="2000" dirty="0" smtClean="0"/>
+              <a:t>library</a:t>
             </a:r>
           </a:p>
           <a:p>
@@ -8628,7 +8713,15 @@
             </a:pPr>
             <a:r>
               <a:rPr lang="en-US" sz="2000" dirty="0" smtClean="0"/>
-              <a:t>Accept License Agreement to continue with installation</a:t>
+              <a:t>Accept the License Agreement to continue </a:t>
+            </a:r>
+            <a:r>
+              <a:rPr lang="en-US" sz="2000" dirty="0" smtClean="0"/>
+              <a:t>the </a:t>
+            </a:r>
+            <a:r>
+              <a:rPr lang="en-US" sz="2000" dirty="0" smtClean="0"/>
+              <a:t>installation</a:t>
             </a:r>
           </a:p>
           <a:p>
@@ -8637,8 +8730,13 @@
             </a:pPr>
             <a:r>
               <a:rPr lang="en-US" sz="2000" dirty="0" smtClean="0"/>
-              <a:t>Click finally on “Finish” button to finish installation</a:t>
-            </a:r>
+              <a:t>Click “Finish” to finish </a:t>
+            </a:r>
+            <a:r>
+              <a:rPr lang="en-US" sz="2000" dirty="0" smtClean="0"/>
+              <a:t>the installation</a:t>
+            </a:r>
+            <a:endParaRPr lang="en-US" sz="2000" dirty="0" smtClean="0"/>
           </a:p>
         </p:txBody>
       </p:sp>
@@ -8953,7 +9051,7 @@
     </p:spTree>
     <p:extLst>
       <p:ext uri="{BB962C8B-B14F-4D97-AF65-F5344CB8AC3E}">
-        <p14:creationId xmlns="" xmlns:p14="http://schemas.microsoft.com/office/powerpoint/2010/main" val="3262966141"/>
+        <p14:creationId xmlns:p14="http://schemas.microsoft.com/office/powerpoint/2010/main" val="3262966141"/>
       </p:ext>
     </p:extLst>
   </p:cSld>
@@ -9021,14 +9119,22 @@
             </a:pPr>
             <a:r>
               <a:rPr lang="en-US" sz="2400" b="1" i="1" dirty="0" smtClean="0"/>
-              <a:t>Open the Ex-2 FPGA.vi</a:t>
+              <a:t>Open </a:t>
+            </a:r>
+            <a:r>
+              <a:rPr lang="en-US" sz="2400" b="1" i="1" dirty="0" smtClean="0"/>
+              <a:t>Ex-2 FPGA.vi</a:t>
             </a:r>
           </a:p>
           <a:p>
             <a:pPr lvl="1"/>
             <a:r>
               <a:rPr lang="en-US" sz="1800" dirty="0"/>
-              <a:t>Double-click on the file named Ex-2 FPGA.vi located under the FPGA target in the hierarchy as shown in Figure A </a:t>
+              <a:t>Double-click on the file named Ex-2 FPGA.vi located under the FPGA target in the </a:t>
+            </a:r>
+            <a:r>
+              <a:rPr lang="en-US" sz="1800" dirty="0" smtClean="0"/>
+              <a:t>project</a:t>
             </a:r>
             <a:endParaRPr lang="en-US" sz="2400" b="1" i="1" dirty="0" smtClean="0"/>
           </a:p>
@@ -9066,8 +9172,13 @@
             </a:r>
             <a:r>
               <a:rPr lang="en-US" sz="2000" dirty="0" smtClean="0"/>
-              <a:t> waveform has nice template  with sequences </a:t>
-            </a:r>
+              <a:t> waveform </a:t>
+            </a:r>
+            <a:r>
+              <a:rPr lang="en-US" sz="2000" dirty="0" smtClean="0"/>
+              <a:t>FPGA template  contains three sequences:</a:t>
+            </a:r>
+            <a:endParaRPr lang="en-US" sz="2000" dirty="0" smtClean="0"/>
           </a:p>
           <a:p>
             <a:pPr marL="457200" indent="-457200">
@@ -9120,7 +9231,7 @@
             </a:r>
             <a:r>
               <a:rPr lang="en-US" sz="2000" b="1" i="1" dirty="0" smtClean="0"/>
-              <a:t>microphone using the content from previous exercise.</a:t>
+              <a:t>microphone using the content from the previous exercise.</a:t>
             </a:r>
             <a:endParaRPr lang="en-US" sz="2000" b="1" i="1" dirty="0">
               <a:effectLst/>
@@ -9705,7 +9816,7 @@
     </p:spTree>
     <p:extLst>
       <p:ext uri="{BB962C8B-B14F-4D97-AF65-F5344CB8AC3E}">
-        <p14:creationId xmlns="" xmlns:p14="http://schemas.microsoft.com/office/powerpoint/2010/main" val="352996725"/>
+        <p14:creationId xmlns:p14="http://schemas.microsoft.com/office/powerpoint/2010/main" val="352996725"/>
       </p:ext>
     </p:extLst>
   </p:cSld>
@@ -10005,21 +10116,19 @@
       </p:sp>
       <p:pic>
         <p:nvPicPr>
-          <p:cNvPr id="8" name="Picture 7"/>
+          <p:cNvPr id="9" name="Picture 8"/>
           <p:cNvPicPr/>
           <p:nvPr/>
         </p:nvPicPr>
-        <p:blipFill>
+        <p:blipFill rotWithShape="1">
           <a:blip r:embed="rId2" cstate="print"/>
-          <a:srcRect/>
-          <a:stretch>
-            <a:fillRect/>
-          </a:stretch>
+          <a:srcRect l="624" t="3720" r="54443" b="26016"/>
+          <a:stretch/>
         </p:blipFill>
         <p:spPr bwMode="auto">
           <a:xfrm>
-            <a:off x="0" y="195573"/>
-            <a:ext cx="5939155" cy="2800350"/>
+            <a:off x="3780971" y="3348745"/>
+            <a:ext cx="2670629" cy="3182544"/>
           </a:xfrm>
           <a:prstGeom prst="rect">
             <a:avLst/>
@@ -10033,79 +10142,58 @@
           </a:ln>
         </p:spPr>
       </p:pic>
-      <p:sp>
-        <p:nvSpPr>
-          <p:cNvPr id="2" name="Rectangle 1"/>
-          <p:cNvSpPr/>
-          <p:nvPr/>
-        </p:nvSpPr>
-        <p:spPr>
-          <a:xfrm>
-            <a:off x="653143" y="312057"/>
-            <a:ext cx="3541486" cy="1110343"/>
-          </a:xfrm>
-          <a:prstGeom prst="rect">
-            <a:avLst/>
-          </a:prstGeom>
-          <a:noFill/>
-          <a:ln w="38100">
-            <a:solidFill>
-              <a:srgbClr val="0070C0"/>
-            </a:solidFill>
-            <a:prstDash val="dash"/>
-          </a:ln>
+      <p:cxnSp>
+        <p:nvCxnSpPr>
+          <p:cNvPr id="14" name="Straight Connector 13"/>
+          <p:cNvCxnSpPr/>
+          <p:nvPr/>
+        </p:nvCxnSpPr>
+        <p:spPr>
+          <a:xfrm>
+            <a:off x="0" y="3192656"/>
+            <a:ext cx="6737820" cy="3872"/>
+          </a:xfrm>
+          <a:prstGeom prst="line">
+            <a:avLst/>
+          </a:prstGeom>
         </p:spPr>
         <p:style>
-          <a:lnRef idx="2">
-            <a:schemeClr val="accent1">
-              <a:shade val="50000"/>
-            </a:schemeClr>
+          <a:lnRef idx="1">
+            <a:schemeClr val="accent1"/>
           </a:lnRef>
-          <a:fillRef idx="1">
+          <a:fillRef idx="0">
             <a:schemeClr val="accent1"/>
           </a:fillRef>
           <a:effectRef idx="0">
             <a:schemeClr val="accent1"/>
           </a:effectRef>
           <a:fontRef idx="minor">
-            <a:schemeClr val="lt1"/>
+            <a:schemeClr val="tx1"/>
           </a:fontRef>
         </p:style>
-        <p:txBody>
-          <a:bodyPr rtlCol="0" anchor="ctr"/>
-          <a:lstStyle/>
-          <a:p>
-            <a:pPr algn="ctr"/>
-            <a:endParaRPr lang="en-US"/>
-          </a:p>
-        </p:txBody>
-      </p:sp>
+      </p:cxnSp>
       <p:pic>
         <p:nvPicPr>
-          <p:cNvPr id="9" name="Picture 8"/>
-          <p:cNvPicPr/>
+          <p:cNvPr id="3" name="Picture 2"/>
+          <p:cNvPicPr>
+            <a:picLocks noChangeAspect="1"/>
+          </p:cNvPicPr>
           <p:nvPr/>
         </p:nvPicPr>
-        <p:blipFill rotWithShape="1">
-          <a:blip r:embed="rId3" cstate="print"/>
-          <a:srcRect l="624" t="3720" r="54443" b="26016"/>
-          <a:stretch/>
+        <p:blipFill>
+          <a:blip r:embed="rId3"/>
+          <a:stretch>
+            <a:fillRect/>
+          </a:stretch>
         </p:blipFill>
-        <p:spPr bwMode="auto">
-          <a:xfrm>
-            <a:off x="3780971" y="3348745"/>
-            <a:ext cx="2670629" cy="3182544"/>
+        <p:spPr>
+          <a:xfrm>
+            <a:off x="133457" y="522110"/>
+            <a:ext cx="5962543" cy="1774220"/>
           </a:xfrm>
           <a:prstGeom prst="rect">
             <a:avLst/>
           </a:prstGeom>
-          <a:noFill/>
-          <a:ln w="9525">
-            <a:noFill/>
-            <a:miter lim="800000"/>
-            <a:headEnd/>
-            <a:tailEnd/>
-          </a:ln>
         </p:spPr>
       </p:pic>
       <p:cxnSp>
@@ -10116,8 +10204,8 @@
         </p:nvCxnSpPr>
         <p:spPr>
           <a:xfrm rot="16200000" flipV="1">
-            <a:off x="426302" y="2136806"/>
-            <a:ext cx="4387055" cy="2931884"/>
+            <a:off x="1552129" y="3262633"/>
+            <a:ext cx="3700439" cy="1366848"/>
           </a:xfrm>
           <a:prstGeom prst="curvedConnector3">
             <a:avLst/>
@@ -10128,36 +10216,6 @@
             </a:solidFill>
             <a:tailEnd type="triangle"/>
           </a:ln>
-        </p:spPr>
-        <p:style>
-          <a:lnRef idx="1">
-            <a:schemeClr val="accent1"/>
-          </a:lnRef>
-          <a:fillRef idx="0">
-            <a:schemeClr val="accent1"/>
-          </a:fillRef>
-          <a:effectRef idx="0">
-            <a:schemeClr val="accent1"/>
-          </a:effectRef>
-          <a:fontRef idx="minor">
-            <a:schemeClr val="tx1"/>
-          </a:fontRef>
-        </p:style>
-      </p:cxnSp>
-      <p:cxnSp>
-        <p:nvCxnSpPr>
-          <p:cNvPr id="14" name="Straight Connector 13"/>
-          <p:cNvCxnSpPr/>
-          <p:nvPr/>
-        </p:nvCxnSpPr>
-        <p:spPr>
-          <a:xfrm>
-            <a:off x="0" y="3192656"/>
-            <a:ext cx="6737820" cy="3872"/>
-          </a:xfrm>
-          <a:prstGeom prst="line">
-            <a:avLst/>
-          </a:prstGeom>
         </p:spPr>
         <p:style>
           <a:lnRef idx="1">
@@ -10177,7 +10235,7 @@
     </p:spTree>
     <p:extLst>
       <p:ext uri="{BB962C8B-B14F-4D97-AF65-F5344CB8AC3E}">
-        <p14:creationId xmlns="" xmlns:p14="http://schemas.microsoft.com/office/powerpoint/2010/main" val="1673386582"/>
+        <p14:creationId xmlns:p14="http://schemas.microsoft.com/office/powerpoint/2010/main" val="1673386582"/>
       </p:ext>
     </p:extLst>
   </p:cSld>
@@ -10754,7 +10812,7 @@
     </p:spTree>
     <p:extLst>
       <p:ext uri="{BB962C8B-B14F-4D97-AF65-F5344CB8AC3E}">
-        <p14:creationId xmlns="" xmlns:p14="http://schemas.microsoft.com/office/powerpoint/2010/main" val="1792766731"/>
+        <p14:creationId xmlns:p14="http://schemas.microsoft.com/office/powerpoint/2010/main" val="1792766731"/>
       </p:ext>
     </p:extLst>
   </p:cSld>
@@ -10788,6 +10846,30 @@
           <a:chExt cx="0" cy="0"/>
         </a:xfrm>
       </p:grpSpPr>
+      <p:pic>
+        <p:nvPicPr>
+          <p:cNvPr id="3" name="Picture 2"/>
+          <p:cNvPicPr>
+            <a:picLocks noChangeAspect="1"/>
+          </p:cNvPicPr>
+          <p:nvPr/>
+        </p:nvPicPr>
+        <p:blipFill>
+          <a:blip r:embed="rId2"/>
+          <a:stretch>
+            <a:fillRect/>
+          </a:stretch>
+        </p:blipFill>
+        <p:spPr>
+          <a:xfrm>
+            <a:off x="-80463" y="53289"/>
+            <a:ext cx="6397163" cy="3370592"/>
+          </a:xfrm>
+          <a:prstGeom prst="rect">
+            <a:avLst/>
+          </a:prstGeom>
+        </p:spPr>
+      </p:pic>
       <p:sp>
         <p:nvSpPr>
           <p:cNvPr id="6" name="Text Placeholder 5"/>
@@ -10880,24 +10962,6 @@
             </a:pPr>
             <a:r>
               <a:rPr lang="en-US" sz="2200" dirty="0" smtClean="0"/>
-              <a:t>Change the </a:t>
-            </a:r>
-            <a:r>
-              <a:rPr lang="en-US" sz="2200" b="1" dirty="0" smtClean="0"/>
-              <a:t>SPI PHY Settings</a:t>
-            </a:r>
-            <a:r>
-              <a:rPr lang="en-US" sz="2200" dirty="0" smtClean="0"/>
-              <a:t> control to a constant, and set the defaults of the constant to match the settings that worked in Exercise 1.</a:t>
-            </a:r>
-          </a:p>
-          <a:p>
-            <a:pPr marL="800100" lvl="1" indent="-342900">
-              <a:buFont typeface="Arial" panose="020B0604020202020204" pitchFamily="34" charset="0"/>
-              <a:buChar char="•"/>
-            </a:pPr>
-            <a:r>
-              <a:rPr lang="en-US" sz="2200" dirty="0" smtClean="0"/>
               <a:t>Select </a:t>
             </a:r>
             <a:r>
@@ -11059,36 +11123,6 @@
           </a:p>
         </p:txBody>
       </p:sp>
-      <p:pic>
-        <p:nvPicPr>
-          <p:cNvPr id="7" name="Picture 6"/>
-          <p:cNvPicPr/>
-          <p:nvPr/>
-        </p:nvPicPr>
-        <p:blipFill>
-          <a:blip r:embed="rId2" cstate="print"/>
-          <a:srcRect/>
-          <a:stretch>
-            <a:fillRect/>
-          </a:stretch>
-        </p:blipFill>
-        <p:spPr bwMode="auto">
-          <a:xfrm>
-            <a:off x="238079" y="21998"/>
-            <a:ext cx="5939155" cy="3495675"/>
-          </a:xfrm>
-          <a:prstGeom prst="rect">
-            <a:avLst/>
-          </a:prstGeom>
-          <a:noFill/>
-          <a:ln w="9525">
-            <a:noFill/>
-            <a:miter lim="800000"/>
-            <a:headEnd/>
-            <a:tailEnd/>
-          </a:ln>
-        </p:spPr>
-      </p:pic>
       <p:sp>
         <p:nvSpPr>
           <p:cNvPr id="2" name="Rectangle 1"/>
@@ -11200,7 +11234,7 @@
     </p:spTree>
     <p:extLst>
       <p:ext uri="{BB962C8B-B14F-4D97-AF65-F5344CB8AC3E}">
-        <p14:creationId xmlns="" xmlns:p14="http://schemas.microsoft.com/office/powerpoint/2010/main" val="3969028615"/>
+        <p14:creationId xmlns:p14="http://schemas.microsoft.com/office/powerpoint/2010/main" val="3969028615"/>
       </p:ext>
     </p:extLst>
   </p:cSld>
@@ -11376,15 +11410,7 @@
             </a:pPr>
             <a:r>
               <a:rPr lang="en-US" sz="1800" dirty="0" smtClean="0"/>
-              <a:t>SPI </a:t>
-            </a:r>
-            <a:r>
-              <a:rPr lang="en-US" sz="1800" dirty="0" smtClean="0"/>
-              <a:t>References to top </a:t>
-            </a:r>
-            <a:r>
-              <a:rPr lang="en-US" sz="1800" dirty="0" smtClean="0"/>
-              <a:t>left</a:t>
+              <a:t>SPI References to top left</a:t>
             </a:r>
           </a:p>
           <a:p>
@@ -11402,15 +11428,7 @@
             </a:pPr>
             <a:r>
               <a:rPr lang="en-US" sz="1800" dirty="0" smtClean="0"/>
-              <a:t>Chip </a:t>
-            </a:r>
-            <a:r>
-              <a:rPr lang="en-US" sz="1800" dirty="0" smtClean="0"/>
-              <a:t>Select to Middle </a:t>
-            </a:r>
-            <a:r>
-              <a:rPr lang="en-US" sz="1800" dirty="0" smtClean="0"/>
-              <a:t>Top</a:t>
+              <a:t>Chip Select to Middle Top</a:t>
             </a:r>
           </a:p>
           <a:p>
@@ -11419,15 +11437,7 @@
             </a:pPr>
             <a:r>
               <a:rPr lang="en-US" sz="1800" dirty="0" smtClean="0"/>
-              <a:t>Data To Device </a:t>
-            </a:r>
-            <a:r>
-              <a:rPr lang="en-US" sz="1800" dirty="0" smtClean="0"/>
-              <a:t>bottom </a:t>
-            </a:r>
-            <a:r>
-              <a:rPr lang="en-US" sz="1800" dirty="0" smtClean="0"/>
-              <a:t>left</a:t>
+              <a:t>Data To Device bottom left</a:t>
             </a:r>
           </a:p>
           <a:p>
@@ -11438,7 +11448,6 @@
               <a:rPr lang="en-US" sz="1800" dirty="0" smtClean="0"/>
               <a:t>Data From Device right side</a:t>
             </a:r>
-            <a:endParaRPr lang="en-US" sz="1800" dirty="0" smtClean="0"/>
           </a:p>
           <a:p>
             <a:pPr marL="400050" indent="-400050">
@@ -11449,11 +11458,7 @@
           <a:p>
             <a:r>
               <a:rPr lang="en-US" sz="2400" b="1" i="1" dirty="0" smtClean="0"/>
-              <a:t>c) </a:t>
-            </a:r>
-            <a:r>
-              <a:rPr lang="en-US" sz="2400" b="1" i="1" dirty="0" smtClean="0"/>
-              <a:t>Repaint </a:t>
+              <a:t>c) Repaint </a:t>
             </a:r>
             <a:r>
               <a:rPr lang="en-US" sz="2400" b="1" i="1" dirty="0" err="1" smtClean="0"/>
@@ -11812,11 +11817,7 @@
           <a:p>
             <a:r>
               <a:rPr lang="en-US" sz="2000" b="1" dirty="0" smtClean="0"/>
-              <a:t>Data </a:t>
-            </a:r>
-            <a:r>
-              <a:rPr lang="en-US" sz="2000" b="1" dirty="0" smtClean="0"/>
-              <a:t>To</a:t>
+              <a:t>Data To</a:t>
             </a:r>
           </a:p>
           <a:p>
@@ -11880,11 +11881,7 @@
           <a:p>
             <a:r>
               <a:rPr lang="en-US" sz="2000" b="1" dirty="0" smtClean="0"/>
-              <a:t>SPI </a:t>
-            </a:r>
-            <a:r>
-              <a:rPr lang="en-US" sz="2000" b="1" dirty="0" smtClean="0"/>
-              <a:t>PHY Settings</a:t>
+              <a:t>SPI PHY Settings</a:t>
             </a:r>
             <a:endParaRPr lang="en-US" sz="2000" b="1" dirty="0"/>
           </a:p>
@@ -12005,7 +12002,7 @@
     </p:spTree>
     <p:extLst>
       <p:ext uri="{BB962C8B-B14F-4D97-AF65-F5344CB8AC3E}">
-        <p14:creationId xmlns="" xmlns:p14="http://schemas.microsoft.com/office/powerpoint/2010/main" val="580335666"/>
+        <p14:creationId xmlns:p14="http://schemas.microsoft.com/office/powerpoint/2010/main" val="580335666"/>
       </p:ext>
     </p:extLst>
   </p:cSld>
@@ -12277,7 +12274,7 @@
   <a:extraClrSchemeLst/>
   <a:extLst>
     <a:ext uri="{05A4C25C-085E-4340-85A3-A5531E510DB2}">
-      <thm15:themeFamily xmlns="" xmlns:thm15="http://schemas.microsoft.com/office/thememl/2012/main" name="Office Theme" id="{62F939B6-93AF-4DB8-9C6B-D6C7DFDC589F}" vid="{4A3C46E8-61CC-4603-A589-7422A47A8E4A}"/>
+      <thm15:themeFamily xmlns:thm15="http://schemas.microsoft.com/office/thememl/2012/main" name="Office Theme" id="{62F939B6-93AF-4DB8-9C6B-D6C7DFDC589F}" vid="{4A3C46E8-61CC-4603-A589-7422A47A8E4A}"/>
     </a:ext>
   </a:extLst>
 </a:theme>

</xml_diff>